<commit_message>
docs: cards are 85mm x 55mm
</commit_message>
<xml_diff>
--- a/src/assets/Carte_visite.pptx
+++ b/src/assets/Carte_visite.pptx
@@ -8,14 +8,14 @@
     <p:sldId id="256" r:id="rId2"/>
     <p:sldId id="257" r:id="rId3"/>
   </p:sldIdLst>
-  <p:sldSz cx="12192000" cy="6858000"/>
+  <p:sldSz cx="3060700" cy="1979613"/>
   <p:notesSz cx="6858000" cy="9144000"/>
   <p:defaultTextStyle>
     <a:defPPr>
       <a:defRPr lang="en-FR"/>
     </a:defPPr>
-    <a:lvl1pPr marL="0" algn="l" defTabSz="914400" rtl="0" eaLnBrk="1" latinLnBrk="0" hangingPunct="1">
-      <a:defRPr sz="1800" kern="1200">
+    <a:lvl1pPr marL="0" algn="l" defTabSz="241781" rtl="0" eaLnBrk="1" latinLnBrk="0" hangingPunct="1">
+      <a:defRPr sz="476" kern="1200">
         <a:solidFill>
           <a:schemeClr val="tx1"/>
         </a:solidFill>
@@ -24,8 +24,8 @@
         <a:cs typeface="+mn-cs"/>
       </a:defRPr>
     </a:lvl1pPr>
-    <a:lvl2pPr marL="457200" algn="l" defTabSz="914400" rtl="0" eaLnBrk="1" latinLnBrk="0" hangingPunct="1">
-      <a:defRPr sz="1800" kern="1200">
+    <a:lvl2pPr marL="120890" algn="l" defTabSz="241781" rtl="0" eaLnBrk="1" latinLnBrk="0" hangingPunct="1">
+      <a:defRPr sz="476" kern="1200">
         <a:solidFill>
           <a:schemeClr val="tx1"/>
         </a:solidFill>
@@ -34,8 +34,8 @@
         <a:cs typeface="+mn-cs"/>
       </a:defRPr>
     </a:lvl2pPr>
-    <a:lvl3pPr marL="914400" algn="l" defTabSz="914400" rtl="0" eaLnBrk="1" latinLnBrk="0" hangingPunct="1">
-      <a:defRPr sz="1800" kern="1200">
+    <a:lvl3pPr marL="241781" algn="l" defTabSz="241781" rtl="0" eaLnBrk="1" latinLnBrk="0" hangingPunct="1">
+      <a:defRPr sz="476" kern="1200">
         <a:solidFill>
           <a:schemeClr val="tx1"/>
         </a:solidFill>
@@ -44,8 +44,8 @@
         <a:cs typeface="+mn-cs"/>
       </a:defRPr>
     </a:lvl3pPr>
-    <a:lvl4pPr marL="1371600" algn="l" defTabSz="914400" rtl="0" eaLnBrk="1" latinLnBrk="0" hangingPunct="1">
-      <a:defRPr sz="1800" kern="1200">
+    <a:lvl4pPr marL="362671" algn="l" defTabSz="241781" rtl="0" eaLnBrk="1" latinLnBrk="0" hangingPunct="1">
+      <a:defRPr sz="476" kern="1200">
         <a:solidFill>
           <a:schemeClr val="tx1"/>
         </a:solidFill>
@@ -54,8 +54,8 @@
         <a:cs typeface="+mn-cs"/>
       </a:defRPr>
     </a:lvl4pPr>
-    <a:lvl5pPr marL="1828800" algn="l" defTabSz="914400" rtl="0" eaLnBrk="1" latinLnBrk="0" hangingPunct="1">
-      <a:defRPr sz="1800" kern="1200">
+    <a:lvl5pPr marL="483562" algn="l" defTabSz="241781" rtl="0" eaLnBrk="1" latinLnBrk="0" hangingPunct="1">
+      <a:defRPr sz="476" kern="1200">
         <a:solidFill>
           <a:schemeClr val="tx1"/>
         </a:solidFill>
@@ -64,8 +64,8 @@
         <a:cs typeface="+mn-cs"/>
       </a:defRPr>
     </a:lvl5pPr>
-    <a:lvl6pPr marL="2286000" algn="l" defTabSz="914400" rtl="0" eaLnBrk="1" latinLnBrk="0" hangingPunct="1">
-      <a:defRPr sz="1800" kern="1200">
+    <a:lvl6pPr marL="604452" algn="l" defTabSz="241781" rtl="0" eaLnBrk="1" latinLnBrk="0" hangingPunct="1">
+      <a:defRPr sz="476" kern="1200">
         <a:solidFill>
           <a:schemeClr val="tx1"/>
         </a:solidFill>
@@ -74,8 +74,8 @@
         <a:cs typeface="+mn-cs"/>
       </a:defRPr>
     </a:lvl6pPr>
-    <a:lvl7pPr marL="2743200" algn="l" defTabSz="914400" rtl="0" eaLnBrk="1" latinLnBrk="0" hangingPunct="1">
-      <a:defRPr sz="1800" kern="1200">
+    <a:lvl7pPr marL="725342" algn="l" defTabSz="241781" rtl="0" eaLnBrk="1" latinLnBrk="0" hangingPunct="1">
+      <a:defRPr sz="476" kern="1200">
         <a:solidFill>
           <a:schemeClr val="tx1"/>
         </a:solidFill>
@@ -84,8 +84,8 @@
         <a:cs typeface="+mn-cs"/>
       </a:defRPr>
     </a:lvl7pPr>
-    <a:lvl8pPr marL="3200400" algn="l" defTabSz="914400" rtl="0" eaLnBrk="1" latinLnBrk="0" hangingPunct="1">
-      <a:defRPr sz="1800" kern="1200">
+    <a:lvl8pPr marL="846233" algn="l" defTabSz="241781" rtl="0" eaLnBrk="1" latinLnBrk="0" hangingPunct="1">
+      <a:defRPr sz="476" kern="1200">
         <a:solidFill>
           <a:schemeClr val="tx1"/>
         </a:solidFill>
@@ -94,8 +94,8 @@
         <a:cs typeface="+mn-cs"/>
       </a:defRPr>
     </a:lvl8pPr>
-    <a:lvl9pPr marL="3657600" algn="l" defTabSz="914400" rtl="0" eaLnBrk="1" latinLnBrk="0" hangingPunct="1">
-      <a:defRPr sz="1800" kern="1200">
+    <a:lvl9pPr marL="967123" algn="l" defTabSz="241781" rtl="0" eaLnBrk="1" latinLnBrk="0" hangingPunct="1">
+      <a:defRPr sz="476" kern="1200">
         <a:solidFill>
           <a:schemeClr val="tx1"/>
         </a:solidFill>
@@ -105,6 +105,11 @@
       </a:defRPr>
     </a:lvl9pPr>
   </p:defaultTextStyle>
+  <p:extLst>
+    <p:ext uri="{EFAFB233-063F-42B5-8137-9DF3F51BA10A}">
+      <p15:sldGuideLst xmlns:p15="http://schemas.microsoft.com/office/powerpoint/2012/main"/>
+    </p:ext>
+  </p:extLst>
 </p:presentation>
 </file>
 
@@ -143,15 +148,15 @@
         </p:nvSpPr>
         <p:spPr>
           <a:xfrm>
-            <a:off x="1524000" y="1122363"/>
-            <a:ext cx="9144000" cy="2387600"/>
+            <a:off x="382589" y="323979"/>
+            <a:ext cx="2295525" cy="689199"/>
           </a:xfrm>
         </p:spPr>
         <p:txBody>
           <a:bodyPr anchor="b"/>
           <a:lstStyle>
             <a:lvl1pPr algn="ctr">
-              <a:defRPr sz="6000"/>
+              <a:defRPr sz="1506"/>
             </a:lvl1pPr>
           </a:lstStyle>
           <a:p>
@@ -181,8 +186,8 @@
         </p:nvSpPr>
         <p:spPr>
           <a:xfrm>
-            <a:off x="1524000" y="3602038"/>
-            <a:ext cx="9144000" cy="1655762"/>
+            <a:off x="382589" y="1039755"/>
+            <a:ext cx="2295525" cy="477948"/>
           </a:xfrm>
         </p:spPr>
         <p:txBody>
@@ -190,39 +195,39 @@
           <a:lstStyle>
             <a:lvl1pPr marL="0" indent="0" algn="ctr">
               <a:buNone/>
-              <a:defRPr sz="2400"/>
+              <a:defRPr sz="602"/>
             </a:lvl1pPr>
-            <a:lvl2pPr marL="457200" indent="0" algn="ctr">
-              <a:buNone/>
-              <a:defRPr sz="2000"/>
+            <a:lvl2pPr marL="114757" indent="0" algn="ctr">
+              <a:buNone/>
+              <a:defRPr sz="502"/>
             </a:lvl2pPr>
-            <a:lvl3pPr marL="914400" indent="0" algn="ctr">
-              <a:buNone/>
-              <a:defRPr sz="1800"/>
+            <a:lvl3pPr marL="229514" indent="0" algn="ctr">
+              <a:buNone/>
+              <a:defRPr sz="452"/>
             </a:lvl3pPr>
-            <a:lvl4pPr marL="1371600" indent="0" algn="ctr">
-              <a:buNone/>
-              <a:defRPr sz="1600"/>
+            <a:lvl4pPr marL="344272" indent="0" algn="ctr">
+              <a:buNone/>
+              <a:defRPr sz="402"/>
             </a:lvl4pPr>
-            <a:lvl5pPr marL="1828800" indent="0" algn="ctr">
-              <a:buNone/>
-              <a:defRPr sz="1600"/>
+            <a:lvl5pPr marL="459029" indent="0" algn="ctr">
+              <a:buNone/>
+              <a:defRPr sz="402"/>
             </a:lvl5pPr>
-            <a:lvl6pPr marL="2286000" indent="0" algn="ctr">
-              <a:buNone/>
-              <a:defRPr sz="1600"/>
+            <a:lvl6pPr marL="573786" indent="0" algn="ctr">
+              <a:buNone/>
+              <a:defRPr sz="402"/>
             </a:lvl6pPr>
-            <a:lvl7pPr marL="2743200" indent="0" algn="ctr">
-              <a:buNone/>
-              <a:defRPr sz="1600"/>
+            <a:lvl7pPr marL="688543" indent="0" algn="ctr">
+              <a:buNone/>
+              <a:defRPr sz="402"/>
             </a:lvl7pPr>
-            <a:lvl8pPr marL="3200400" indent="0" algn="ctr">
-              <a:buNone/>
-              <a:defRPr sz="1600"/>
+            <a:lvl8pPr marL="803300" indent="0" algn="ctr">
+              <a:buNone/>
+              <a:defRPr sz="402"/>
             </a:lvl8pPr>
-            <a:lvl9pPr marL="3657600" indent="0" algn="ctr">
-              <a:buNone/>
-              <a:defRPr sz="1600"/>
+            <a:lvl9pPr marL="918058" indent="0" algn="ctr">
+              <a:buNone/>
+              <a:defRPr sz="402"/>
             </a:lvl9pPr>
           </a:lstStyle>
           <a:p>
@@ -565,8 +570,8 @@
         </p:nvSpPr>
         <p:spPr>
           <a:xfrm>
-            <a:off x="8724900" y="365125"/>
-            <a:ext cx="2628900" cy="5811838"/>
+            <a:off x="2190314" y="105396"/>
+            <a:ext cx="659963" cy="1677631"/>
           </a:xfrm>
         </p:spPr>
         <p:txBody>
@@ -599,8 +604,8 @@
         </p:nvSpPr>
         <p:spPr>
           <a:xfrm>
-            <a:off x="838200" y="365125"/>
-            <a:ext cx="7734300" cy="5811838"/>
+            <a:off x="210423" y="105396"/>
+            <a:ext cx="1941632" cy="1677631"/>
           </a:xfrm>
         </p:spPr>
         <p:txBody>
@@ -975,15 +980,15 @@
         </p:nvSpPr>
         <p:spPr>
           <a:xfrm>
-            <a:off x="831850" y="1709738"/>
-            <a:ext cx="10515600" cy="2852737"/>
+            <a:off x="208829" y="493529"/>
+            <a:ext cx="2639854" cy="823464"/>
           </a:xfrm>
         </p:spPr>
         <p:txBody>
           <a:bodyPr anchor="b"/>
           <a:lstStyle>
             <a:lvl1pPr>
-              <a:defRPr sz="6000"/>
+              <a:defRPr sz="1506"/>
             </a:lvl1pPr>
           </a:lstStyle>
           <a:p>
@@ -1013,8 +1018,8 @@
         </p:nvSpPr>
         <p:spPr>
           <a:xfrm>
-            <a:off x="831850" y="4589463"/>
-            <a:ext cx="10515600" cy="1500187"/>
+            <a:off x="208829" y="1324783"/>
+            <a:ext cx="2639854" cy="433040"/>
           </a:xfrm>
         </p:spPr>
         <p:txBody>
@@ -1022,7 +1027,7 @@
           <a:lstStyle>
             <a:lvl1pPr marL="0" indent="0">
               <a:buNone/>
-              <a:defRPr sz="2400">
+              <a:defRPr sz="602">
                 <a:solidFill>
                   <a:schemeClr val="tx1">
                     <a:tint val="75000"/>
@@ -1030,9 +1035,9 @@
                 </a:solidFill>
               </a:defRPr>
             </a:lvl1pPr>
-            <a:lvl2pPr marL="457200" indent="0">
-              <a:buNone/>
-              <a:defRPr sz="2000">
+            <a:lvl2pPr marL="114757" indent="0">
+              <a:buNone/>
+              <a:defRPr sz="502">
                 <a:solidFill>
                   <a:schemeClr val="tx1">
                     <a:tint val="75000"/>
@@ -1040,9 +1045,9 @@
                 </a:solidFill>
               </a:defRPr>
             </a:lvl2pPr>
-            <a:lvl3pPr marL="914400" indent="0">
-              <a:buNone/>
-              <a:defRPr sz="1800">
+            <a:lvl3pPr marL="229514" indent="0">
+              <a:buNone/>
+              <a:defRPr sz="452">
                 <a:solidFill>
                   <a:schemeClr val="tx1">
                     <a:tint val="75000"/>
@@ -1050,9 +1055,9 @@
                 </a:solidFill>
               </a:defRPr>
             </a:lvl3pPr>
-            <a:lvl4pPr marL="1371600" indent="0">
-              <a:buNone/>
-              <a:defRPr sz="1600">
+            <a:lvl4pPr marL="344272" indent="0">
+              <a:buNone/>
+              <a:defRPr sz="402">
                 <a:solidFill>
                   <a:schemeClr val="tx1">
                     <a:tint val="75000"/>
@@ -1060,9 +1065,9 @@
                 </a:solidFill>
               </a:defRPr>
             </a:lvl4pPr>
-            <a:lvl5pPr marL="1828800" indent="0">
-              <a:buNone/>
-              <a:defRPr sz="1600">
+            <a:lvl5pPr marL="459029" indent="0">
+              <a:buNone/>
+              <a:defRPr sz="402">
                 <a:solidFill>
                   <a:schemeClr val="tx1">
                     <a:tint val="75000"/>
@@ -1070,9 +1075,9 @@
                 </a:solidFill>
               </a:defRPr>
             </a:lvl5pPr>
-            <a:lvl6pPr marL="2286000" indent="0">
-              <a:buNone/>
-              <a:defRPr sz="1600">
+            <a:lvl6pPr marL="573786" indent="0">
+              <a:buNone/>
+              <a:defRPr sz="402">
                 <a:solidFill>
                   <a:schemeClr val="tx1">
                     <a:tint val="75000"/>
@@ -1080,9 +1085,9 @@
                 </a:solidFill>
               </a:defRPr>
             </a:lvl6pPr>
-            <a:lvl7pPr marL="2743200" indent="0">
-              <a:buNone/>
-              <a:defRPr sz="1600">
+            <a:lvl7pPr marL="688543" indent="0">
+              <a:buNone/>
+              <a:defRPr sz="402">
                 <a:solidFill>
                   <a:schemeClr val="tx1">
                     <a:tint val="75000"/>
@@ -1090,9 +1095,9 @@
                 </a:solidFill>
               </a:defRPr>
             </a:lvl7pPr>
-            <a:lvl8pPr marL="3200400" indent="0">
-              <a:buNone/>
-              <a:defRPr sz="1600">
+            <a:lvl8pPr marL="803300" indent="0">
+              <a:buNone/>
+              <a:defRPr sz="402">
                 <a:solidFill>
                   <a:schemeClr val="tx1">
                     <a:tint val="75000"/>
@@ -1100,9 +1105,9 @@
                 </a:solidFill>
               </a:defRPr>
             </a:lvl8pPr>
-            <a:lvl9pPr marL="3657600" indent="0">
-              <a:buNone/>
-              <a:defRPr sz="1600">
+            <a:lvl9pPr marL="918058" indent="0">
+              <a:buNone/>
+              <a:defRPr sz="402">
                 <a:solidFill>
                   <a:schemeClr val="tx1">
                     <a:tint val="75000"/>
@@ -1280,8 +1285,8 @@
         </p:nvSpPr>
         <p:spPr>
           <a:xfrm>
-            <a:off x="838200" y="1825625"/>
-            <a:ext cx="5181600" cy="4351338"/>
+            <a:off x="210423" y="526980"/>
+            <a:ext cx="1300798" cy="1256046"/>
           </a:xfrm>
         </p:spPr>
         <p:txBody>
@@ -1343,8 +1348,8 @@
         </p:nvSpPr>
         <p:spPr>
           <a:xfrm>
-            <a:off x="6172200" y="1825625"/>
-            <a:ext cx="5181600" cy="4351338"/>
+            <a:off x="1549479" y="526980"/>
+            <a:ext cx="1300798" cy="1256046"/>
           </a:xfrm>
         </p:spPr>
         <p:txBody>
@@ -1519,8 +1524,8 @@
         </p:nvSpPr>
         <p:spPr>
           <a:xfrm>
-            <a:off x="839788" y="365125"/>
-            <a:ext cx="10515600" cy="1325563"/>
+            <a:off x="210822" y="105396"/>
+            <a:ext cx="2639854" cy="382634"/>
           </a:xfrm>
         </p:spPr>
         <p:txBody>
@@ -1553,8 +1558,8 @@
         </p:nvSpPr>
         <p:spPr>
           <a:xfrm>
-            <a:off x="839788" y="1681163"/>
-            <a:ext cx="5157787" cy="823912"/>
+            <a:off x="210823" y="485280"/>
+            <a:ext cx="1294819" cy="237828"/>
           </a:xfrm>
         </p:spPr>
         <p:txBody>
@@ -1562,39 +1567,39 @@
           <a:lstStyle>
             <a:lvl1pPr marL="0" indent="0">
               <a:buNone/>
-              <a:defRPr sz="2400" b="1"/>
+              <a:defRPr sz="602" b="1"/>
             </a:lvl1pPr>
-            <a:lvl2pPr marL="457200" indent="0">
-              <a:buNone/>
-              <a:defRPr sz="2000" b="1"/>
+            <a:lvl2pPr marL="114757" indent="0">
+              <a:buNone/>
+              <a:defRPr sz="502" b="1"/>
             </a:lvl2pPr>
-            <a:lvl3pPr marL="914400" indent="0">
-              <a:buNone/>
-              <a:defRPr sz="1800" b="1"/>
+            <a:lvl3pPr marL="229514" indent="0">
+              <a:buNone/>
+              <a:defRPr sz="452" b="1"/>
             </a:lvl3pPr>
-            <a:lvl4pPr marL="1371600" indent="0">
-              <a:buNone/>
-              <a:defRPr sz="1600" b="1"/>
+            <a:lvl4pPr marL="344272" indent="0">
+              <a:buNone/>
+              <a:defRPr sz="402" b="1"/>
             </a:lvl4pPr>
-            <a:lvl5pPr marL="1828800" indent="0">
-              <a:buNone/>
-              <a:defRPr sz="1600" b="1"/>
+            <a:lvl5pPr marL="459029" indent="0">
+              <a:buNone/>
+              <a:defRPr sz="402" b="1"/>
             </a:lvl5pPr>
-            <a:lvl6pPr marL="2286000" indent="0">
-              <a:buNone/>
-              <a:defRPr sz="1600" b="1"/>
+            <a:lvl6pPr marL="573786" indent="0">
+              <a:buNone/>
+              <a:defRPr sz="402" b="1"/>
             </a:lvl6pPr>
-            <a:lvl7pPr marL="2743200" indent="0">
-              <a:buNone/>
-              <a:defRPr sz="1600" b="1"/>
+            <a:lvl7pPr marL="688543" indent="0">
+              <a:buNone/>
+              <a:defRPr sz="402" b="1"/>
             </a:lvl7pPr>
-            <a:lvl8pPr marL="3200400" indent="0">
-              <a:buNone/>
-              <a:defRPr sz="1600" b="1"/>
+            <a:lvl8pPr marL="803300" indent="0">
+              <a:buNone/>
+              <a:defRPr sz="402" b="1"/>
             </a:lvl8pPr>
-            <a:lvl9pPr marL="3657600" indent="0">
-              <a:buNone/>
-              <a:defRPr sz="1600" b="1"/>
+            <a:lvl9pPr marL="918058" indent="0">
+              <a:buNone/>
+              <a:defRPr sz="402" b="1"/>
             </a:lvl9pPr>
           </a:lstStyle>
           <a:p>
@@ -1624,8 +1629,8 @@
         </p:nvSpPr>
         <p:spPr>
           <a:xfrm>
-            <a:off x="839788" y="2505075"/>
-            <a:ext cx="5157787" cy="3684588"/>
+            <a:off x="210823" y="723109"/>
+            <a:ext cx="1294819" cy="1063584"/>
           </a:xfrm>
         </p:spPr>
         <p:txBody>
@@ -1687,8 +1692,8 @@
         </p:nvSpPr>
         <p:spPr>
           <a:xfrm>
-            <a:off x="6172200" y="1681163"/>
-            <a:ext cx="5183188" cy="823912"/>
+            <a:off x="1549479" y="485280"/>
+            <a:ext cx="1301196" cy="237828"/>
           </a:xfrm>
         </p:spPr>
         <p:txBody>
@@ -1696,39 +1701,39 @@
           <a:lstStyle>
             <a:lvl1pPr marL="0" indent="0">
               <a:buNone/>
-              <a:defRPr sz="2400" b="1"/>
+              <a:defRPr sz="602" b="1"/>
             </a:lvl1pPr>
-            <a:lvl2pPr marL="457200" indent="0">
-              <a:buNone/>
-              <a:defRPr sz="2000" b="1"/>
+            <a:lvl2pPr marL="114757" indent="0">
+              <a:buNone/>
+              <a:defRPr sz="502" b="1"/>
             </a:lvl2pPr>
-            <a:lvl3pPr marL="914400" indent="0">
-              <a:buNone/>
-              <a:defRPr sz="1800" b="1"/>
+            <a:lvl3pPr marL="229514" indent="0">
+              <a:buNone/>
+              <a:defRPr sz="452" b="1"/>
             </a:lvl3pPr>
-            <a:lvl4pPr marL="1371600" indent="0">
-              <a:buNone/>
-              <a:defRPr sz="1600" b="1"/>
+            <a:lvl4pPr marL="344272" indent="0">
+              <a:buNone/>
+              <a:defRPr sz="402" b="1"/>
             </a:lvl4pPr>
-            <a:lvl5pPr marL="1828800" indent="0">
-              <a:buNone/>
-              <a:defRPr sz="1600" b="1"/>
+            <a:lvl5pPr marL="459029" indent="0">
+              <a:buNone/>
+              <a:defRPr sz="402" b="1"/>
             </a:lvl5pPr>
-            <a:lvl6pPr marL="2286000" indent="0">
-              <a:buNone/>
-              <a:defRPr sz="1600" b="1"/>
+            <a:lvl6pPr marL="573786" indent="0">
+              <a:buNone/>
+              <a:defRPr sz="402" b="1"/>
             </a:lvl6pPr>
-            <a:lvl7pPr marL="2743200" indent="0">
-              <a:buNone/>
-              <a:defRPr sz="1600" b="1"/>
+            <a:lvl7pPr marL="688543" indent="0">
+              <a:buNone/>
+              <a:defRPr sz="402" b="1"/>
             </a:lvl7pPr>
-            <a:lvl8pPr marL="3200400" indent="0">
-              <a:buNone/>
-              <a:defRPr sz="1600" b="1"/>
+            <a:lvl8pPr marL="803300" indent="0">
+              <a:buNone/>
+              <a:defRPr sz="402" b="1"/>
             </a:lvl8pPr>
-            <a:lvl9pPr marL="3657600" indent="0">
-              <a:buNone/>
-              <a:defRPr sz="1600" b="1"/>
+            <a:lvl9pPr marL="918058" indent="0">
+              <a:buNone/>
+              <a:defRPr sz="402" b="1"/>
             </a:lvl9pPr>
           </a:lstStyle>
           <a:p>
@@ -1758,8 +1763,8 @@
         </p:nvSpPr>
         <p:spPr>
           <a:xfrm>
-            <a:off x="6172200" y="2505075"/>
-            <a:ext cx="5183188" cy="3684588"/>
+            <a:off x="1549479" y="723109"/>
+            <a:ext cx="1301196" cy="1063584"/>
           </a:xfrm>
         </p:spPr>
         <p:txBody>
@@ -2189,15 +2194,15 @@
         </p:nvSpPr>
         <p:spPr>
           <a:xfrm>
-            <a:off x="839788" y="457200"/>
-            <a:ext cx="3932237" cy="1600200"/>
+            <a:off x="210823" y="131974"/>
+            <a:ext cx="987155" cy="461910"/>
           </a:xfrm>
         </p:spPr>
         <p:txBody>
           <a:bodyPr anchor="b"/>
           <a:lstStyle>
             <a:lvl1pPr>
-              <a:defRPr sz="3200"/>
+              <a:defRPr sz="803"/>
             </a:lvl1pPr>
           </a:lstStyle>
           <a:p>
@@ -2227,39 +2232,39 @@
         </p:nvSpPr>
         <p:spPr>
           <a:xfrm>
-            <a:off x="5183188" y="987425"/>
-            <a:ext cx="6172200" cy="4873625"/>
+            <a:off x="1301197" y="285028"/>
+            <a:ext cx="1549479" cy="1406808"/>
           </a:xfrm>
         </p:spPr>
         <p:txBody>
           <a:bodyPr/>
           <a:lstStyle>
             <a:lvl1pPr>
-              <a:defRPr sz="3200"/>
+              <a:defRPr sz="803"/>
             </a:lvl1pPr>
             <a:lvl2pPr>
-              <a:defRPr sz="2800"/>
+              <a:defRPr sz="703"/>
             </a:lvl2pPr>
             <a:lvl3pPr>
-              <a:defRPr sz="2400"/>
+              <a:defRPr sz="602"/>
             </a:lvl3pPr>
             <a:lvl4pPr>
-              <a:defRPr sz="2000"/>
+              <a:defRPr sz="502"/>
             </a:lvl4pPr>
             <a:lvl5pPr>
-              <a:defRPr sz="2000"/>
+              <a:defRPr sz="502"/>
             </a:lvl5pPr>
             <a:lvl6pPr>
-              <a:defRPr sz="2000"/>
+              <a:defRPr sz="502"/>
             </a:lvl6pPr>
             <a:lvl7pPr>
-              <a:defRPr sz="2000"/>
+              <a:defRPr sz="502"/>
             </a:lvl7pPr>
             <a:lvl8pPr>
-              <a:defRPr sz="2000"/>
+              <a:defRPr sz="502"/>
             </a:lvl8pPr>
             <a:lvl9pPr>
-              <a:defRPr sz="2000"/>
+              <a:defRPr sz="502"/>
             </a:lvl9pPr>
           </a:lstStyle>
           <a:p>
@@ -2318,8 +2323,8 @@
         </p:nvSpPr>
         <p:spPr>
           <a:xfrm>
-            <a:off x="839788" y="2057400"/>
-            <a:ext cx="3932237" cy="3811588"/>
+            <a:off x="210823" y="593885"/>
+            <a:ext cx="987155" cy="1100243"/>
           </a:xfrm>
         </p:spPr>
         <p:txBody>
@@ -2327,39 +2332,39 @@
           <a:lstStyle>
             <a:lvl1pPr marL="0" indent="0">
               <a:buNone/>
-              <a:defRPr sz="1600"/>
+              <a:defRPr sz="402"/>
             </a:lvl1pPr>
-            <a:lvl2pPr marL="457200" indent="0">
-              <a:buNone/>
-              <a:defRPr sz="1400"/>
+            <a:lvl2pPr marL="114757" indent="0">
+              <a:buNone/>
+              <a:defRPr sz="351"/>
             </a:lvl2pPr>
-            <a:lvl3pPr marL="914400" indent="0">
-              <a:buNone/>
-              <a:defRPr sz="1200"/>
+            <a:lvl3pPr marL="229514" indent="0">
+              <a:buNone/>
+              <a:defRPr sz="301"/>
             </a:lvl3pPr>
-            <a:lvl4pPr marL="1371600" indent="0">
-              <a:buNone/>
-              <a:defRPr sz="1000"/>
+            <a:lvl4pPr marL="344272" indent="0">
+              <a:buNone/>
+              <a:defRPr sz="251"/>
             </a:lvl4pPr>
-            <a:lvl5pPr marL="1828800" indent="0">
-              <a:buNone/>
-              <a:defRPr sz="1000"/>
+            <a:lvl5pPr marL="459029" indent="0">
+              <a:buNone/>
+              <a:defRPr sz="251"/>
             </a:lvl5pPr>
-            <a:lvl6pPr marL="2286000" indent="0">
-              <a:buNone/>
-              <a:defRPr sz="1000"/>
+            <a:lvl6pPr marL="573786" indent="0">
+              <a:buNone/>
+              <a:defRPr sz="251"/>
             </a:lvl6pPr>
-            <a:lvl7pPr marL="2743200" indent="0">
-              <a:buNone/>
-              <a:defRPr sz="1000"/>
+            <a:lvl7pPr marL="688543" indent="0">
+              <a:buNone/>
+              <a:defRPr sz="251"/>
             </a:lvl7pPr>
-            <a:lvl8pPr marL="3200400" indent="0">
-              <a:buNone/>
-              <a:defRPr sz="1000"/>
+            <a:lvl8pPr marL="803300" indent="0">
+              <a:buNone/>
+              <a:defRPr sz="251"/>
             </a:lvl8pPr>
-            <a:lvl9pPr marL="3657600" indent="0">
-              <a:buNone/>
-              <a:defRPr sz="1000"/>
+            <a:lvl9pPr marL="918058" indent="0">
+              <a:buNone/>
+              <a:defRPr sz="251"/>
             </a:lvl9pPr>
           </a:lstStyle>
           <a:p>
@@ -2502,15 +2507,15 @@
         </p:nvSpPr>
         <p:spPr>
           <a:xfrm>
-            <a:off x="839788" y="457200"/>
-            <a:ext cx="3932237" cy="1600200"/>
+            <a:off x="210823" y="131974"/>
+            <a:ext cx="987155" cy="461910"/>
           </a:xfrm>
         </p:spPr>
         <p:txBody>
           <a:bodyPr anchor="b"/>
           <a:lstStyle>
             <a:lvl1pPr>
-              <a:defRPr sz="3200"/>
+              <a:defRPr sz="803"/>
             </a:lvl1pPr>
           </a:lstStyle>
           <a:p>
@@ -2540,8 +2545,8 @@
         </p:nvSpPr>
         <p:spPr>
           <a:xfrm>
-            <a:off x="5183188" y="987425"/>
-            <a:ext cx="6172200" cy="4873625"/>
+            <a:off x="1301197" y="285028"/>
+            <a:ext cx="1549479" cy="1406808"/>
           </a:xfrm>
         </p:spPr>
         <p:txBody>
@@ -2549,39 +2554,39 @@
           <a:lstStyle>
             <a:lvl1pPr marL="0" indent="0">
               <a:buNone/>
-              <a:defRPr sz="3200"/>
+              <a:defRPr sz="803"/>
             </a:lvl1pPr>
-            <a:lvl2pPr marL="457200" indent="0">
-              <a:buNone/>
-              <a:defRPr sz="2800"/>
+            <a:lvl2pPr marL="114757" indent="0">
+              <a:buNone/>
+              <a:defRPr sz="703"/>
             </a:lvl2pPr>
-            <a:lvl3pPr marL="914400" indent="0">
-              <a:buNone/>
-              <a:defRPr sz="2400"/>
+            <a:lvl3pPr marL="229514" indent="0">
+              <a:buNone/>
+              <a:defRPr sz="602"/>
             </a:lvl3pPr>
-            <a:lvl4pPr marL="1371600" indent="0">
-              <a:buNone/>
-              <a:defRPr sz="2000"/>
+            <a:lvl4pPr marL="344272" indent="0">
+              <a:buNone/>
+              <a:defRPr sz="502"/>
             </a:lvl4pPr>
-            <a:lvl5pPr marL="1828800" indent="0">
-              <a:buNone/>
-              <a:defRPr sz="2000"/>
+            <a:lvl5pPr marL="459029" indent="0">
+              <a:buNone/>
+              <a:defRPr sz="502"/>
             </a:lvl5pPr>
-            <a:lvl6pPr marL="2286000" indent="0">
-              <a:buNone/>
-              <a:defRPr sz="2000"/>
+            <a:lvl6pPr marL="573786" indent="0">
+              <a:buNone/>
+              <a:defRPr sz="502"/>
             </a:lvl6pPr>
-            <a:lvl7pPr marL="2743200" indent="0">
-              <a:buNone/>
-              <a:defRPr sz="2000"/>
+            <a:lvl7pPr marL="688543" indent="0">
+              <a:buNone/>
+              <a:defRPr sz="502"/>
             </a:lvl7pPr>
-            <a:lvl8pPr marL="3200400" indent="0">
-              <a:buNone/>
-              <a:defRPr sz="2000"/>
+            <a:lvl8pPr marL="803300" indent="0">
+              <a:buNone/>
+              <a:defRPr sz="502"/>
             </a:lvl8pPr>
-            <a:lvl9pPr marL="3657600" indent="0">
-              <a:buNone/>
-              <a:defRPr sz="2000"/>
+            <a:lvl9pPr marL="918058" indent="0">
+              <a:buNone/>
+              <a:defRPr sz="502"/>
             </a:lvl9pPr>
           </a:lstStyle>
           <a:p>
@@ -2607,8 +2612,8 @@
         </p:nvSpPr>
         <p:spPr>
           <a:xfrm>
-            <a:off x="839788" y="2057400"/>
-            <a:ext cx="3932237" cy="3811588"/>
+            <a:off x="210823" y="593885"/>
+            <a:ext cx="987155" cy="1100243"/>
           </a:xfrm>
         </p:spPr>
         <p:txBody>
@@ -2616,39 +2621,39 @@
           <a:lstStyle>
             <a:lvl1pPr marL="0" indent="0">
               <a:buNone/>
-              <a:defRPr sz="1600"/>
+              <a:defRPr sz="402"/>
             </a:lvl1pPr>
-            <a:lvl2pPr marL="457200" indent="0">
-              <a:buNone/>
-              <a:defRPr sz="1400"/>
+            <a:lvl2pPr marL="114757" indent="0">
+              <a:buNone/>
+              <a:defRPr sz="351"/>
             </a:lvl2pPr>
-            <a:lvl3pPr marL="914400" indent="0">
-              <a:buNone/>
-              <a:defRPr sz="1200"/>
+            <a:lvl3pPr marL="229514" indent="0">
+              <a:buNone/>
+              <a:defRPr sz="301"/>
             </a:lvl3pPr>
-            <a:lvl4pPr marL="1371600" indent="0">
-              <a:buNone/>
-              <a:defRPr sz="1000"/>
+            <a:lvl4pPr marL="344272" indent="0">
+              <a:buNone/>
+              <a:defRPr sz="251"/>
             </a:lvl4pPr>
-            <a:lvl5pPr marL="1828800" indent="0">
-              <a:buNone/>
-              <a:defRPr sz="1000"/>
+            <a:lvl5pPr marL="459029" indent="0">
+              <a:buNone/>
+              <a:defRPr sz="251"/>
             </a:lvl5pPr>
-            <a:lvl6pPr marL="2286000" indent="0">
-              <a:buNone/>
-              <a:defRPr sz="1000"/>
+            <a:lvl6pPr marL="573786" indent="0">
+              <a:buNone/>
+              <a:defRPr sz="251"/>
             </a:lvl6pPr>
-            <a:lvl7pPr marL="2743200" indent="0">
-              <a:buNone/>
-              <a:defRPr sz="1000"/>
+            <a:lvl7pPr marL="688543" indent="0">
+              <a:buNone/>
+              <a:defRPr sz="251"/>
             </a:lvl7pPr>
-            <a:lvl8pPr marL="3200400" indent="0">
-              <a:buNone/>
-              <a:defRPr sz="1000"/>
+            <a:lvl8pPr marL="803300" indent="0">
+              <a:buNone/>
+              <a:defRPr sz="251"/>
             </a:lvl8pPr>
-            <a:lvl9pPr marL="3657600" indent="0">
-              <a:buNone/>
-              <a:defRPr sz="1000"/>
+            <a:lvl9pPr marL="918058" indent="0">
+              <a:buNone/>
+              <a:defRPr sz="251"/>
             </a:lvl9pPr>
           </a:lstStyle>
           <a:p>
@@ -2796,8 +2801,8 @@
         </p:nvSpPr>
         <p:spPr>
           <a:xfrm>
-            <a:off x="838200" y="365125"/>
-            <a:ext cx="10515600" cy="1325563"/>
+            <a:off x="210423" y="105396"/>
+            <a:ext cx="2639854" cy="382634"/>
           </a:xfrm>
           <a:prstGeom prst="rect">
             <a:avLst/>
@@ -2835,8 +2840,8 @@
         </p:nvSpPr>
         <p:spPr>
           <a:xfrm>
-            <a:off x="838200" y="1825625"/>
-            <a:ext cx="10515600" cy="4351338"/>
+            <a:off x="210423" y="526980"/>
+            <a:ext cx="2639854" cy="1256046"/>
           </a:xfrm>
           <a:prstGeom prst="rect">
             <a:avLst/>
@@ -2903,8 +2908,8 @@
         </p:nvSpPr>
         <p:spPr>
           <a:xfrm>
-            <a:off x="838200" y="6356350"/>
-            <a:ext cx="2743200" cy="365125"/>
+            <a:off x="210423" y="1834808"/>
+            <a:ext cx="688658" cy="105396"/>
           </a:xfrm>
           <a:prstGeom prst="rect">
             <a:avLst/>
@@ -2914,7 +2919,7 @@
           <a:bodyPr vert="horz" lIns="91440" tIns="45720" rIns="91440" bIns="45720" rtlCol="0" anchor="ctr"/>
           <a:lstStyle>
             <a:lvl1pPr algn="l">
-              <a:defRPr sz="1200">
+              <a:defRPr sz="301">
                 <a:solidFill>
                   <a:schemeClr val="tx1">
                     <a:tint val="75000"/>
@@ -2950,8 +2955,8 @@
         </p:nvSpPr>
         <p:spPr>
           <a:xfrm>
-            <a:off x="4038600" y="6356350"/>
-            <a:ext cx="4114800" cy="365125"/>
+            <a:off x="1013857" y="1834808"/>
+            <a:ext cx="1032986" cy="105396"/>
           </a:xfrm>
           <a:prstGeom prst="rect">
             <a:avLst/>
@@ -2961,7 +2966,7 @@
           <a:bodyPr vert="horz" lIns="91440" tIns="45720" rIns="91440" bIns="45720" rtlCol="0" anchor="ctr"/>
           <a:lstStyle>
             <a:lvl1pPr algn="ctr">
-              <a:defRPr sz="1200">
+              <a:defRPr sz="301">
                 <a:solidFill>
                   <a:schemeClr val="tx1">
                     <a:tint val="75000"/>
@@ -2993,8 +2998,8 @@
         </p:nvSpPr>
         <p:spPr>
           <a:xfrm>
-            <a:off x="8610600" y="6356350"/>
-            <a:ext cx="2743200" cy="365125"/>
+            <a:off x="2161619" y="1834808"/>
+            <a:ext cx="688658" cy="105396"/>
           </a:xfrm>
           <a:prstGeom prst="rect">
             <a:avLst/>
@@ -3004,7 +3009,7 @@
           <a:bodyPr vert="horz" lIns="91440" tIns="45720" rIns="91440" bIns="45720" rtlCol="0" anchor="ctr"/>
           <a:lstStyle>
             <a:lvl1pPr algn="r">
-              <a:defRPr sz="1200">
+              <a:defRPr sz="301">
                 <a:solidFill>
                   <a:schemeClr val="tx1">
                     <a:tint val="75000"/>
@@ -3045,7 +3050,7 @@
   </p:sldLayoutIdLst>
   <p:txStyles>
     <p:titleStyle>
-      <a:lvl1pPr algn="l" defTabSz="914400" rtl="0" eaLnBrk="1" latinLnBrk="0" hangingPunct="1">
+      <a:lvl1pPr algn="l" defTabSz="229514" rtl="0" eaLnBrk="1" latinLnBrk="0" hangingPunct="1">
         <a:lnSpc>
           <a:spcPct val="90000"/>
         </a:lnSpc>
@@ -3053,7 +3058,7 @@
           <a:spcPct val="0"/>
         </a:spcBef>
         <a:buNone/>
-        <a:defRPr sz="4400" kern="1200">
+        <a:defRPr sz="1104" kern="1200">
           <a:solidFill>
             <a:schemeClr val="tx1"/>
           </a:solidFill>
@@ -3064,16 +3069,16 @@
       </a:lvl1pPr>
     </p:titleStyle>
     <p:bodyStyle>
-      <a:lvl1pPr marL="228600" indent="-228600" algn="l" defTabSz="914400" rtl="0" eaLnBrk="1" latinLnBrk="0" hangingPunct="1">
+      <a:lvl1pPr marL="57379" indent="-57379" algn="l" defTabSz="229514" rtl="0" eaLnBrk="1" latinLnBrk="0" hangingPunct="1">
         <a:lnSpc>
           <a:spcPct val="90000"/>
         </a:lnSpc>
         <a:spcBef>
-          <a:spcPts val="1000"/>
+          <a:spcPts val="251"/>
         </a:spcBef>
         <a:buFont typeface="Arial" panose="020B0604020202020204" pitchFamily="34" charset="0"/>
         <a:buChar char="•"/>
-        <a:defRPr sz="2800" kern="1200">
+        <a:defRPr sz="703" kern="1200">
           <a:solidFill>
             <a:schemeClr val="tx1"/>
           </a:solidFill>
@@ -3082,16 +3087,16 @@
           <a:cs typeface="+mn-cs"/>
         </a:defRPr>
       </a:lvl1pPr>
-      <a:lvl2pPr marL="685800" indent="-228600" algn="l" defTabSz="914400" rtl="0" eaLnBrk="1" latinLnBrk="0" hangingPunct="1">
+      <a:lvl2pPr marL="172136" indent="-57379" algn="l" defTabSz="229514" rtl="0" eaLnBrk="1" latinLnBrk="0" hangingPunct="1">
         <a:lnSpc>
           <a:spcPct val="90000"/>
         </a:lnSpc>
         <a:spcBef>
-          <a:spcPts val="500"/>
+          <a:spcPts val="125"/>
         </a:spcBef>
         <a:buFont typeface="Arial" panose="020B0604020202020204" pitchFamily="34" charset="0"/>
         <a:buChar char="•"/>
-        <a:defRPr sz="2400" kern="1200">
+        <a:defRPr sz="602" kern="1200">
           <a:solidFill>
             <a:schemeClr val="tx1"/>
           </a:solidFill>
@@ -3100,16 +3105,16 @@
           <a:cs typeface="+mn-cs"/>
         </a:defRPr>
       </a:lvl2pPr>
-      <a:lvl3pPr marL="1143000" indent="-228600" algn="l" defTabSz="914400" rtl="0" eaLnBrk="1" latinLnBrk="0" hangingPunct="1">
+      <a:lvl3pPr marL="286893" indent="-57379" algn="l" defTabSz="229514" rtl="0" eaLnBrk="1" latinLnBrk="0" hangingPunct="1">
         <a:lnSpc>
           <a:spcPct val="90000"/>
         </a:lnSpc>
         <a:spcBef>
-          <a:spcPts val="500"/>
+          <a:spcPts val="125"/>
         </a:spcBef>
         <a:buFont typeface="Arial" panose="020B0604020202020204" pitchFamily="34" charset="0"/>
         <a:buChar char="•"/>
-        <a:defRPr sz="2000" kern="1200">
+        <a:defRPr sz="502" kern="1200">
           <a:solidFill>
             <a:schemeClr val="tx1"/>
           </a:solidFill>
@@ -3118,16 +3123,16 @@
           <a:cs typeface="+mn-cs"/>
         </a:defRPr>
       </a:lvl3pPr>
-      <a:lvl4pPr marL="1600200" indent="-228600" algn="l" defTabSz="914400" rtl="0" eaLnBrk="1" latinLnBrk="0" hangingPunct="1">
+      <a:lvl4pPr marL="401650" indent="-57379" algn="l" defTabSz="229514" rtl="0" eaLnBrk="1" latinLnBrk="0" hangingPunct="1">
         <a:lnSpc>
           <a:spcPct val="90000"/>
         </a:lnSpc>
         <a:spcBef>
-          <a:spcPts val="500"/>
+          <a:spcPts val="125"/>
         </a:spcBef>
         <a:buFont typeface="Arial" panose="020B0604020202020204" pitchFamily="34" charset="0"/>
         <a:buChar char="•"/>
-        <a:defRPr sz="1800" kern="1200">
+        <a:defRPr sz="452" kern="1200">
           <a:solidFill>
             <a:schemeClr val="tx1"/>
           </a:solidFill>
@@ -3136,16 +3141,16 @@
           <a:cs typeface="+mn-cs"/>
         </a:defRPr>
       </a:lvl4pPr>
-      <a:lvl5pPr marL="2057400" indent="-228600" algn="l" defTabSz="914400" rtl="0" eaLnBrk="1" latinLnBrk="0" hangingPunct="1">
+      <a:lvl5pPr marL="516407" indent="-57379" algn="l" defTabSz="229514" rtl="0" eaLnBrk="1" latinLnBrk="0" hangingPunct="1">
         <a:lnSpc>
           <a:spcPct val="90000"/>
         </a:lnSpc>
         <a:spcBef>
-          <a:spcPts val="500"/>
+          <a:spcPts val="125"/>
         </a:spcBef>
         <a:buFont typeface="Arial" panose="020B0604020202020204" pitchFamily="34" charset="0"/>
         <a:buChar char="•"/>
-        <a:defRPr sz="1800" kern="1200">
+        <a:defRPr sz="452" kern="1200">
           <a:solidFill>
             <a:schemeClr val="tx1"/>
           </a:solidFill>
@@ -3154,16 +3159,16 @@
           <a:cs typeface="+mn-cs"/>
         </a:defRPr>
       </a:lvl5pPr>
-      <a:lvl6pPr marL="2514600" indent="-228600" algn="l" defTabSz="914400" rtl="0" eaLnBrk="1" latinLnBrk="0" hangingPunct="1">
+      <a:lvl6pPr marL="631165" indent="-57379" algn="l" defTabSz="229514" rtl="0" eaLnBrk="1" latinLnBrk="0" hangingPunct="1">
         <a:lnSpc>
           <a:spcPct val="90000"/>
         </a:lnSpc>
         <a:spcBef>
-          <a:spcPts val="500"/>
+          <a:spcPts val="125"/>
         </a:spcBef>
         <a:buFont typeface="Arial" panose="020B0604020202020204" pitchFamily="34" charset="0"/>
         <a:buChar char="•"/>
-        <a:defRPr sz="1800" kern="1200">
+        <a:defRPr sz="452" kern="1200">
           <a:solidFill>
             <a:schemeClr val="tx1"/>
           </a:solidFill>
@@ -3172,16 +3177,16 @@
           <a:cs typeface="+mn-cs"/>
         </a:defRPr>
       </a:lvl6pPr>
-      <a:lvl7pPr marL="2971800" indent="-228600" algn="l" defTabSz="914400" rtl="0" eaLnBrk="1" latinLnBrk="0" hangingPunct="1">
+      <a:lvl7pPr marL="745922" indent="-57379" algn="l" defTabSz="229514" rtl="0" eaLnBrk="1" latinLnBrk="0" hangingPunct="1">
         <a:lnSpc>
           <a:spcPct val="90000"/>
         </a:lnSpc>
         <a:spcBef>
-          <a:spcPts val="500"/>
+          <a:spcPts val="125"/>
         </a:spcBef>
         <a:buFont typeface="Arial" panose="020B0604020202020204" pitchFamily="34" charset="0"/>
         <a:buChar char="•"/>
-        <a:defRPr sz="1800" kern="1200">
+        <a:defRPr sz="452" kern="1200">
           <a:solidFill>
             <a:schemeClr val="tx1"/>
           </a:solidFill>
@@ -3190,16 +3195,16 @@
           <a:cs typeface="+mn-cs"/>
         </a:defRPr>
       </a:lvl7pPr>
-      <a:lvl8pPr marL="3429000" indent="-228600" algn="l" defTabSz="914400" rtl="0" eaLnBrk="1" latinLnBrk="0" hangingPunct="1">
+      <a:lvl8pPr marL="860679" indent="-57379" algn="l" defTabSz="229514" rtl="0" eaLnBrk="1" latinLnBrk="0" hangingPunct="1">
         <a:lnSpc>
           <a:spcPct val="90000"/>
         </a:lnSpc>
         <a:spcBef>
-          <a:spcPts val="500"/>
+          <a:spcPts val="125"/>
         </a:spcBef>
         <a:buFont typeface="Arial" panose="020B0604020202020204" pitchFamily="34" charset="0"/>
         <a:buChar char="•"/>
-        <a:defRPr sz="1800" kern="1200">
+        <a:defRPr sz="452" kern="1200">
           <a:solidFill>
             <a:schemeClr val="tx1"/>
           </a:solidFill>
@@ -3208,16 +3213,16 @@
           <a:cs typeface="+mn-cs"/>
         </a:defRPr>
       </a:lvl8pPr>
-      <a:lvl9pPr marL="3886200" indent="-228600" algn="l" defTabSz="914400" rtl="0" eaLnBrk="1" latinLnBrk="0" hangingPunct="1">
+      <a:lvl9pPr marL="975436" indent="-57379" algn="l" defTabSz="229514" rtl="0" eaLnBrk="1" latinLnBrk="0" hangingPunct="1">
         <a:lnSpc>
           <a:spcPct val="90000"/>
         </a:lnSpc>
         <a:spcBef>
-          <a:spcPts val="500"/>
+          <a:spcPts val="125"/>
         </a:spcBef>
         <a:buFont typeface="Arial" panose="020B0604020202020204" pitchFamily="34" charset="0"/>
         <a:buChar char="•"/>
-        <a:defRPr sz="1800" kern="1200">
+        <a:defRPr sz="452" kern="1200">
           <a:solidFill>
             <a:schemeClr val="tx1"/>
           </a:solidFill>
@@ -3231,8 +3236,8 @@
       <a:defPPr>
         <a:defRPr lang="en-FR"/>
       </a:defPPr>
-      <a:lvl1pPr marL="0" algn="l" defTabSz="914400" rtl="0" eaLnBrk="1" latinLnBrk="0" hangingPunct="1">
-        <a:defRPr sz="1800" kern="1200">
+      <a:lvl1pPr marL="0" algn="l" defTabSz="229514" rtl="0" eaLnBrk="1" latinLnBrk="0" hangingPunct="1">
+        <a:defRPr sz="452" kern="1200">
           <a:solidFill>
             <a:schemeClr val="tx1"/>
           </a:solidFill>
@@ -3241,8 +3246,8 @@
           <a:cs typeface="+mn-cs"/>
         </a:defRPr>
       </a:lvl1pPr>
-      <a:lvl2pPr marL="457200" algn="l" defTabSz="914400" rtl="0" eaLnBrk="1" latinLnBrk="0" hangingPunct="1">
-        <a:defRPr sz="1800" kern="1200">
+      <a:lvl2pPr marL="114757" algn="l" defTabSz="229514" rtl="0" eaLnBrk="1" latinLnBrk="0" hangingPunct="1">
+        <a:defRPr sz="452" kern="1200">
           <a:solidFill>
             <a:schemeClr val="tx1"/>
           </a:solidFill>
@@ -3251,8 +3256,8 @@
           <a:cs typeface="+mn-cs"/>
         </a:defRPr>
       </a:lvl2pPr>
-      <a:lvl3pPr marL="914400" algn="l" defTabSz="914400" rtl="0" eaLnBrk="1" latinLnBrk="0" hangingPunct="1">
-        <a:defRPr sz="1800" kern="1200">
+      <a:lvl3pPr marL="229514" algn="l" defTabSz="229514" rtl="0" eaLnBrk="1" latinLnBrk="0" hangingPunct="1">
+        <a:defRPr sz="452" kern="1200">
           <a:solidFill>
             <a:schemeClr val="tx1"/>
           </a:solidFill>
@@ -3261,8 +3266,8 @@
           <a:cs typeface="+mn-cs"/>
         </a:defRPr>
       </a:lvl3pPr>
-      <a:lvl4pPr marL="1371600" algn="l" defTabSz="914400" rtl="0" eaLnBrk="1" latinLnBrk="0" hangingPunct="1">
-        <a:defRPr sz="1800" kern="1200">
+      <a:lvl4pPr marL="344272" algn="l" defTabSz="229514" rtl="0" eaLnBrk="1" latinLnBrk="0" hangingPunct="1">
+        <a:defRPr sz="452" kern="1200">
           <a:solidFill>
             <a:schemeClr val="tx1"/>
           </a:solidFill>
@@ -3271,8 +3276,8 @@
           <a:cs typeface="+mn-cs"/>
         </a:defRPr>
       </a:lvl4pPr>
-      <a:lvl5pPr marL="1828800" algn="l" defTabSz="914400" rtl="0" eaLnBrk="1" latinLnBrk="0" hangingPunct="1">
-        <a:defRPr sz="1800" kern="1200">
+      <a:lvl5pPr marL="459029" algn="l" defTabSz="229514" rtl="0" eaLnBrk="1" latinLnBrk="0" hangingPunct="1">
+        <a:defRPr sz="452" kern="1200">
           <a:solidFill>
             <a:schemeClr val="tx1"/>
           </a:solidFill>
@@ -3281,8 +3286,8 @@
           <a:cs typeface="+mn-cs"/>
         </a:defRPr>
       </a:lvl5pPr>
-      <a:lvl6pPr marL="2286000" algn="l" defTabSz="914400" rtl="0" eaLnBrk="1" latinLnBrk="0" hangingPunct="1">
-        <a:defRPr sz="1800" kern="1200">
+      <a:lvl6pPr marL="573786" algn="l" defTabSz="229514" rtl="0" eaLnBrk="1" latinLnBrk="0" hangingPunct="1">
+        <a:defRPr sz="452" kern="1200">
           <a:solidFill>
             <a:schemeClr val="tx1"/>
           </a:solidFill>
@@ -3291,8 +3296,8 @@
           <a:cs typeface="+mn-cs"/>
         </a:defRPr>
       </a:lvl6pPr>
-      <a:lvl7pPr marL="2743200" algn="l" defTabSz="914400" rtl="0" eaLnBrk="1" latinLnBrk="0" hangingPunct="1">
-        <a:defRPr sz="1800" kern="1200">
+      <a:lvl7pPr marL="688543" algn="l" defTabSz="229514" rtl="0" eaLnBrk="1" latinLnBrk="0" hangingPunct="1">
+        <a:defRPr sz="452" kern="1200">
           <a:solidFill>
             <a:schemeClr val="tx1"/>
           </a:solidFill>
@@ -3301,8 +3306,8 @@
           <a:cs typeface="+mn-cs"/>
         </a:defRPr>
       </a:lvl7pPr>
-      <a:lvl8pPr marL="3200400" algn="l" defTabSz="914400" rtl="0" eaLnBrk="1" latinLnBrk="0" hangingPunct="1">
-        <a:defRPr sz="1800" kern="1200">
+      <a:lvl8pPr marL="803300" algn="l" defTabSz="229514" rtl="0" eaLnBrk="1" latinLnBrk="0" hangingPunct="1">
+        <a:defRPr sz="452" kern="1200">
           <a:solidFill>
             <a:schemeClr val="tx1"/>
           </a:solidFill>
@@ -3311,8 +3316,8 @@
           <a:cs typeface="+mn-cs"/>
         </a:defRPr>
       </a:lvl8pPr>
-      <a:lvl9pPr marL="3657600" algn="l" defTabSz="914400" rtl="0" eaLnBrk="1" latinLnBrk="0" hangingPunct="1">
-        <a:defRPr sz="1800" kern="1200">
+      <a:lvl9pPr marL="918058" algn="l" defTabSz="229514" rtl="0" eaLnBrk="1" latinLnBrk="0" hangingPunct="1">
+        <a:defRPr sz="452" kern="1200">
           <a:solidFill>
             <a:schemeClr val="tx1"/>
           </a:solidFill>
@@ -3373,8 +3378,8 @@
         </p:blipFill>
         <p:spPr>
           <a:xfrm>
-            <a:off x="1199535" y="674738"/>
-            <a:ext cx="9792930" cy="5508523"/>
+            <a:off x="301133" y="298371"/>
+            <a:ext cx="2458433" cy="1382869"/>
           </a:xfrm>
           <a:prstGeom prst="rect">
             <a:avLst/>
@@ -3425,8 +3430,8 @@
         </p:nvSpPr>
         <p:spPr>
           <a:xfrm>
-            <a:off x="4430237" y="6156776"/>
-            <a:ext cx="3331523" cy="338554"/>
+            <a:off x="263619" y="1565616"/>
+            <a:ext cx="931915" cy="154209"/>
           </a:xfrm>
           <a:prstGeom prst="rect">
             <a:avLst/>
@@ -3441,7 +3446,7 @@
           <a:p>
             <a:pPr algn="ctr"/>
             <a:r>
-              <a:rPr lang="en-FR" sz="1600" dirty="0">
+              <a:rPr lang="en-FR" sz="402" dirty="0">
                 <a:solidFill>
                   <a:srgbClr val="5865F3"/>
                 </a:solidFill>
@@ -3466,8 +3471,8 @@
         </p:nvSpPr>
         <p:spPr>
           <a:xfrm>
-            <a:off x="399474" y="6156776"/>
-            <a:ext cx="3712192" cy="338554"/>
+            <a:off x="1064392" y="1298958"/>
+            <a:ext cx="931915" cy="154209"/>
           </a:xfrm>
           <a:prstGeom prst="rect">
             <a:avLst/>
@@ -3482,7 +3487,7 @@
           <a:p>
             <a:pPr algn="ctr"/>
             <a:r>
-              <a:rPr lang="en-FR" sz="1600" dirty="0">
+              <a:rPr lang="en-FR" sz="402" dirty="0">
                 <a:solidFill>
                   <a:srgbClr val="293656"/>
                 </a:solidFill>
@@ -3509,8 +3514,8 @@
         </p:nvSpPr>
         <p:spPr>
           <a:xfrm>
-            <a:off x="7823302" y="6156776"/>
-            <a:ext cx="4226256" cy="338554"/>
+            <a:off x="1731253" y="1558892"/>
+            <a:ext cx="1199740" cy="154209"/>
           </a:xfrm>
           <a:prstGeom prst="rect">
             <a:avLst/>
@@ -3523,37 +3528,15 @@
           </a:bodyPr>
           <a:lstStyle/>
           <a:p>
-            <a:pPr marL="0" marR="0" lvl="0" indent="0" algn="ctr" defTabSz="914400" rtl="0" eaLnBrk="1" fontAlgn="auto" latinLnBrk="0" hangingPunct="1">
-              <a:lnSpc>
-                <a:spcPct val="100000"/>
-              </a:lnSpc>
-              <a:spcBef>
-                <a:spcPts val="0"/>
-              </a:spcBef>
-              <a:spcAft>
-                <a:spcPts val="0"/>
-              </a:spcAft>
-              <a:buClrTx/>
-              <a:buSzTx/>
-              <a:buFontTx/>
-              <a:buNone/>
-              <a:tabLst/>
+            <a:pPr algn="ctr" defTabSz="229514">
               <a:defRPr/>
             </a:pPr>
             <a:r>
-              <a:rPr kumimoji="0" lang="en-FR" sz="1600" b="0" i="0" u="none" strike="noStrike" kern="1200" cap="none" spc="0" normalizeH="0" baseline="0" noProof="0" dirty="0">
-                <a:ln>
-                  <a:noFill/>
-                </a:ln>
+              <a:rPr lang="en-FR" sz="402" dirty="0">
                 <a:solidFill>
                   <a:srgbClr val="FB1A53"/>
                 </a:solidFill>
-                <a:effectLst/>
-                <a:uLnTx/>
-                <a:uFillTx/>
                 <a:latin typeface="Calibri" panose="020F0502020204030204"/>
-                <a:ea typeface="+mn-ea"/>
-                <a:cs typeface="+mn-cs"/>
               </a:rPr>
               <a:t>meetup.com/fr-FR/software-crafters-strasbourg</a:t>
             </a:r>
@@ -3574,8 +3557,8 @@
         </p:nvSpPr>
         <p:spPr>
           <a:xfrm>
-            <a:off x="921861" y="1418063"/>
-            <a:ext cx="10348273" cy="707886"/>
+            <a:off x="231425" y="208129"/>
+            <a:ext cx="2597848" cy="246862"/>
           </a:xfrm>
           <a:prstGeom prst="rect">
             <a:avLst/>
@@ -3590,7 +3573,7 @@
           <a:p>
             <a:pPr algn="ctr"/>
             <a:r>
-              <a:rPr lang="en-GB" sz="4000" b="1" dirty="0">
+              <a:rPr lang="en-GB" sz="1004" b="1" dirty="0">
                 <a:solidFill>
                   <a:srgbClr val="293656"/>
                 </a:solidFill>
@@ -3600,7 +3583,7 @@
               </a:rPr>
               <a:t>&lt;Software Crafters Strasbourg&gt;</a:t>
             </a:r>
-            <a:endParaRPr lang="en-FR" sz="4000" b="1" dirty="0">
+            <a:endParaRPr lang="en-FR" sz="1004" b="1" dirty="0">
               <a:solidFill>
                 <a:srgbClr val="293656"/>
               </a:solidFill>
@@ -3639,8 +3622,8 @@
         </p:blipFill>
         <p:spPr>
           <a:xfrm>
-            <a:off x="8602723" y="3138435"/>
-            <a:ext cx="2667414" cy="2787297"/>
+            <a:off x="1996307" y="806429"/>
+            <a:ext cx="669632" cy="699728"/>
           </a:xfrm>
           <a:prstGeom prst="rect">
             <a:avLst/>
@@ -3677,8 +3660,8 @@
         </p:blipFill>
         <p:spPr>
           <a:xfrm>
-            <a:off x="4762293" y="3138435"/>
-            <a:ext cx="2667414" cy="2786722"/>
+            <a:off x="394761" y="806574"/>
+            <a:ext cx="669632" cy="699583"/>
           </a:xfrm>
         </p:spPr>
       </p:pic>
@@ -3710,8 +3693,8 @@
         </p:blipFill>
         <p:spPr>
           <a:xfrm>
-            <a:off x="921863" y="3138435"/>
-            <a:ext cx="2667414" cy="2786722"/>
+            <a:off x="1195534" y="591632"/>
+            <a:ext cx="669632" cy="699583"/>
           </a:xfrm>
           <a:prstGeom prst="rect">
             <a:avLst/>

</xml_diff>